<commit_message>
changed: aggiornamento presentazione, organizzazione corretta cartella
</commit_message>
<xml_diff>
--- a/esercitazione_3/documents/Esercitazione 3.pptx
+++ b/esercitazione_3/documents/Esercitazione 3.pptx
@@ -13,38 +13,37 @@
     <p:sldId id="260" r:id="rId7"/>
     <p:sldId id="265" r:id="rId8"/>
     <p:sldId id="262" r:id="rId9"/>
-    <p:sldId id="263" r:id="rId10"/>
-    <p:sldId id="261" r:id="rId11"/>
+    <p:sldId id="261" r:id="rId10"/>
   </p:sldIdLst>
   <p:sldSz cx="18288000" cy="10287000"/>
   <p:notesSz cx="6858000" cy="9144000"/>
   <p:embeddedFontLst>
     <p:embeddedFont>
       <p:font typeface="Calibri" panose="020F0502020204030204" pitchFamily="34" charset="0"/>
-      <p:regular r:id="rId12"/>
-      <p:bold r:id="rId13"/>
-      <p:italic r:id="rId14"/>
-      <p:boldItalic r:id="rId15"/>
+      <p:regular r:id="rId11"/>
+      <p:bold r:id="rId12"/>
+      <p:italic r:id="rId13"/>
+      <p:boldItalic r:id="rId14"/>
     </p:embeddedFont>
     <p:embeddedFont>
       <p:font typeface="Open Sans" panose="020B0606030504020204" pitchFamily="34" charset="0"/>
-      <p:regular r:id="rId16"/>
-      <p:bold r:id="rId17"/>
-      <p:italic r:id="rId18"/>
-      <p:boldItalic r:id="rId19"/>
+      <p:regular r:id="rId15"/>
+      <p:bold r:id="rId16"/>
+      <p:italic r:id="rId17"/>
+      <p:boldItalic r:id="rId18"/>
     </p:embeddedFont>
     <p:embeddedFont>
       <p:font typeface="Open Sans Extra Bold" panose="020B0604020202020204" charset="0"/>
-      <p:regular r:id="rId20"/>
+      <p:regular r:id="rId19"/>
     </p:embeddedFont>
     <p:embeddedFont>
       <p:font typeface="Open Sans Light" panose="020B0306030504020204" pitchFamily="34" charset="0"/>
-      <p:regular r:id="rId21"/>
-      <p:italic r:id="rId22"/>
+      <p:regular r:id="rId20"/>
+      <p:italic r:id="rId21"/>
     </p:embeddedFont>
     <p:embeddedFont>
       <p:font typeface="Open Sans Light Bold" panose="020B0604020202020204" charset="0"/>
-      <p:regular r:id="rId23"/>
+      <p:regular r:id="rId22"/>
     </p:embeddedFont>
   </p:embeddedFontLst>
   <p:defaultTextStyle>
@@ -161,6 +160,14 @@
 </p:presentation>
 </file>
 
+<file path=ppt/revisionInfo.xml><?xml version="1.0" encoding="utf-8"?>
+<p1510:revInfo xmlns:a="http://schemas.openxmlformats.org/drawingml/2006/main" xmlns:r="http://schemas.openxmlformats.org/officeDocument/2006/relationships" xmlns:p1510="http://schemas.microsoft.com/office/powerpoint/2015/10/main">
+  <p1510:revLst>
+    <p1510:client id="{93E8013D-5D9F-D8D0-3077-AD1DAEF36394}" v="56" dt="2021-11-02T00:15:21.420"/>
+  </p1510:revLst>
+</p1510:revInfo>
+</file>
+
 <file path=ppt/slideLayouts/slideLayout1.xml><?xml version="1.0" encoding="utf-8"?>
 <p:sldLayout xmlns:a="http://schemas.openxmlformats.org/drawingml/2006/main" xmlns:r="http://schemas.openxmlformats.org/officeDocument/2006/relationships" xmlns:p="http://schemas.openxmlformats.org/presentationml/2006/main" type="title" preserve="1">
   <p:cSld name="Title Slide">
@@ -341,7 +348,7 @@
             <a:fld id="{1D8BD707-D9CF-40AE-B4C6-C98DA3205C09}" type="datetimeFigureOut">
               <a:rPr lang="en-US" smtClean="0"/>
               <a:pPr/>
-              <a:t>10/31/2021</a:t>
+              <a:t>11/1/2021</a:t>
             </a:fld>
             <a:endParaRPr lang="en-US" dirty="0"/>
           </a:p>
@@ -506,7 +513,7 @@
             <a:fld id="{1D8BD707-D9CF-40AE-B4C6-C98DA3205C09}" type="datetimeFigureOut">
               <a:rPr lang="en-US" smtClean="0"/>
               <a:pPr/>
-              <a:t>10/31/2021</a:t>
+              <a:t>11/1/2021</a:t>
             </a:fld>
             <a:endParaRPr lang="en-US" dirty="0"/>
           </a:p>
@@ -681,7 +688,7 @@
             <a:fld id="{1D8BD707-D9CF-40AE-B4C6-C98DA3205C09}" type="datetimeFigureOut">
               <a:rPr lang="en-US" smtClean="0"/>
               <a:pPr/>
-              <a:t>10/31/2021</a:t>
+              <a:t>11/1/2021</a:t>
             </a:fld>
             <a:endParaRPr lang="en-US" dirty="0"/>
           </a:p>
@@ -846,7 +853,7 @@
             <a:fld id="{1D8BD707-D9CF-40AE-B4C6-C98DA3205C09}" type="datetimeFigureOut">
               <a:rPr lang="en-US" smtClean="0"/>
               <a:pPr/>
-              <a:t>10/31/2021</a:t>
+              <a:t>11/1/2021</a:t>
             </a:fld>
             <a:endParaRPr lang="en-US" dirty="0"/>
           </a:p>
@@ -1088,7 +1095,7 @@
             <a:fld id="{1D8BD707-D9CF-40AE-B4C6-C98DA3205C09}" type="datetimeFigureOut">
               <a:rPr lang="en-US" smtClean="0"/>
               <a:pPr/>
-              <a:t>10/31/2021</a:t>
+              <a:t>11/1/2021</a:t>
             </a:fld>
             <a:endParaRPr lang="en-US" dirty="0"/>
           </a:p>
@@ -1370,7 +1377,7 @@
             <a:fld id="{1D8BD707-D9CF-40AE-B4C6-C98DA3205C09}" type="datetimeFigureOut">
               <a:rPr lang="en-US" smtClean="0"/>
               <a:pPr/>
-              <a:t>10/31/2021</a:t>
+              <a:t>11/1/2021</a:t>
             </a:fld>
             <a:endParaRPr lang="en-US" dirty="0"/>
           </a:p>
@@ -1786,7 +1793,7 @@
             <a:fld id="{1D8BD707-D9CF-40AE-B4C6-C98DA3205C09}" type="datetimeFigureOut">
               <a:rPr lang="en-US" smtClean="0"/>
               <a:pPr/>
-              <a:t>10/31/2021</a:t>
+              <a:t>11/1/2021</a:t>
             </a:fld>
             <a:endParaRPr lang="en-US" dirty="0"/>
           </a:p>
@@ -1900,7 +1907,7 @@
             <a:fld id="{1D8BD707-D9CF-40AE-B4C6-C98DA3205C09}" type="datetimeFigureOut">
               <a:rPr lang="en-US" smtClean="0"/>
               <a:pPr/>
-              <a:t>10/31/2021</a:t>
+              <a:t>11/1/2021</a:t>
             </a:fld>
             <a:endParaRPr lang="en-US" dirty="0"/>
           </a:p>
@@ -1992,7 +1999,7 @@
             <a:fld id="{1D8BD707-D9CF-40AE-B4C6-C98DA3205C09}" type="datetimeFigureOut">
               <a:rPr lang="en-US" smtClean="0"/>
               <a:pPr/>
-              <a:t>10/31/2021</a:t>
+              <a:t>11/1/2021</a:t>
             </a:fld>
             <a:endParaRPr lang="en-US" dirty="0"/>
           </a:p>
@@ -2264,7 +2271,7 @@
             <a:fld id="{1D8BD707-D9CF-40AE-B4C6-C98DA3205C09}" type="datetimeFigureOut">
               <a:rPr lang="en-US" smtClean="0"/>
               <a:pPr/>
-              <a:t>10/31/2021</a:t>
+              <a:t>11/1/2021</a:t>
             </a:fld>
             <a:endParaRPr lang="en-US" dirty="0"/>
           </a:p>
@@ -2513,7 +2520,7 @@
             <a:fld id="{1D8BD707-D9CF-40AE-B4C6-C98DA3205C09}" type="datetimeFigureOut">
               <a:rPr lang="en-US" smtClean="0"/>
               <a:pPr/>
-              <a:t>10/31/2021</a:t>
+              <a:t>11/1/2021</a:t>
             </a:fld>
             <a:endParaRPr lang="en-US" dirty="0"/>
           </a:p>
@@ -2721,7 +2728,7 @@
             <a:fld id="{1D8BD707-D9CF-40AE-B4C6-C98DA3205C09}" type="datetimeFigureOut">
               <a:rPr lang="en-US" smtClean="0"/>
               <a:pPr/>
-              <a:t>10/31/2021</a:t>
+              <a:t>11/1/2021</a:t>
             </a:fld>
             <a:endParaRPr lang="en-US" dirty="0"/>
           </a:p>
@@ -3216,13 +3223,22 @@
               </a:lnSpc>
             </a:pPr>
             <a:r>
+              <a:rPr lang="en-US" sz="9000" dirty="0" err="1">
+                <a:solidFill>
+                  <a:srgbClr val="000000"/>
+                </a:solidFill>
+                <a:latin typeface="Open Sans Extra Bold"/>
+              </a:rPr>
+              <a:t>Esercitazione</a:t>
+            </a:r>
+            <a:r>
               <a:rPr lang="en-US" sz="9000" dirty="0">
                 <a:solidFill>
                   <a:srgbClr val="000000"/>
                 </a:solidFill>
                 <a:latin typeface="Open Sans Extra Bold"/>
               </a:rPr>
-              <a:t>Esercitazione 2</a:t>
+              <a:t> 3</a:t>
             </a:r>
           </a:p>
           <a:p>
@@ -3266,7 +3282,7 @@
         <p:spPr>
           <a:xfrm>
             <a:off x="7834568" y="5342890"/>
-            <a:ext cx="8823722" cy="1808765"/>
+            <a:ext cx="8823722" cy="872611"/>
           </a:xfrm>
           <a:prstGeom prst="rect">
             <a:avLst/>
@@ -3290,25 +3306,11 @@
                 </a:solidFill>
                 <a:latin typeface="Open Sans"/>
               </a:rPr>
-              <a:t>Socket in JAVA </a:t>
-            </a:r>
-            <a:br>
-              <a:rPr lang="en-US" sz="5150" dirty="0">
-                <a:solidFill>
-                  <a:srgbClr val="000000"/>
-                </a:solidFill>
-                <a:latin typeface="Open Sans"/>
-              </a:rPr>
-            </a:br>
-            <a:r>
-              <a:rPr lang="en-US" sz="5150" dirty="0">
-                <a:solidFill>
-                  <a:srgbClr val="000000"/>
-                </a:solidFill>
-                <a:latin typeface="Open Sans"/>
-              </a:rPr>
-              <a:t>(connection oriented)</a:t>
-            </a:r>
+              <a:t>Socket in C </a:t>
+            </a:r>
+            <a:endParaRPr lang="en-US" sz="5150" dirty="0">
+              <a:latin typeface="Open Sans"/>
+            </a:endParaRPr>
           </a:p>
         </p:txBody>
       </p:sp>
@@ -3576,508 +3578,6 @@
           </p:txBody>
         </p:sp>
       </p:grpSp>
-    </p:spTree>
-  </p:cSld>
-  <p:clrMapOvr>
-    <a:masterClrMapping/>
-  </p:clrMapOvr>
-</p:sld>
-</file>
-
-<file path=ppt/slides/slide10.xml><?xml version="1.0" encoding="utf-8"?>
-<p:sld xmlns:a="http://schemas.openxmlformats.org/drawingml/2006/main" xmlns:r="http://schemas.openxmlformats.org/officeDocument/2006/relationships" xmlns:p="http://schemas.openxmlformats.org/presentationml/2006/main">
-  <p:cSld>
-    <p:bg>
-      <p:bgPr>
-        <a:solidFill>
-          <a:srgbClr val="FF914D"/>
-        </a:solidFill>
-        <a:effectLst/>
-      </p:bgPr>
-    </p:bg>
-    <p:spTree>
-      <p:nvGrpSpPr>
-        <p:cNvPr id="1" name=""/>
-        <p:cNvGrpSpPr/>
-        <p:nvPr/>
-      </p:nvGrpSpPr>
-      <p:grpSpPr>
-        <a:xfrm>
-          <a:off x="0" y="0"/>
-          <a:ext cx="0" cy="0"/>
-          <a:chOff x="0" y="0"/>
-          <a:chExt cx="0" cy="0"/>
-        </a:xfrm>
-      </p:grpSpPr>
-      <p:grpSp>
-        <p:nvGrpSpPr>
-          <p:cNvPr id="2" name="Group 2"/>
-          <p:cNvGrpSpPr/>
-          <p:nvPr/>
-        </p:nvGrpSpPr>
-        <p:grpSpPr>
-          <a:xfrm>
-            <a:off x="8629650" y="0"/>
-            <a:ext cx="9658350" cy="10287000"/>
-            <a:chOff x="0" y="0"/>
-            <a:chExt cx="3267146" cy="3479800"/>
-          </a:xfrm>
-        </p:grpSpPr>
-        <p:sp>
-          <p:nvSpPr>
-            <p:cNvPr id="3" name="Freeform 3"/>
-            <p:cNvSpPr/>
-            <p:nvPr/>
-          </p:nvSpPr>
-          <p:spPr>
-            <a:xfrm>
-              <a:off x="0" y="0"/>
-              <a:ext cx="3267146" cy="3479800"/>
-            </a:xfrm>
-            <a:custGeom>
-              <a:avLst/>
-              <a:gdLst/>
-              <a:ahLst/>
-              <a:cxnLst/>
-              <a:rect l="l" t="t" r="r" b="b"/>
-              <a:pathLst>
-                <a:path w="3267146" h="3479800">
-                  <a:moveTo>
-                    <a:pt x="0" y="0"/>
-                  </a:moveTo>
-                  <a:lnTo>
-                    <a:pt x="3267146" y="0"/>
-                  </a:lnTo>
-                  <a:lnTo>
-                    <a:pt x="3267146" y="3479800"/>
-                  </a:lnTo>
-                  <a:lnTo>
-                    <a:pt x="0" y="3479800"/>
-                  </a:lnTo>
-                  <a:close/>
-                </a:path>
-              </a:pathLst>
-            </a:custGeom>
-            <a:solidFill>
-              <a:srgbClr val="004AAD"/>
-            </a:solidFill>
-          </p:spPr>
-        </p:sp>
-      </p:grpSp>
-      <p:grpSp>
-        <p:nvGrpSpPr>
-          <p:cNvPr id="4" name="Group 4"/>
-          <p:cNvGrpSpPr/>
-          <p:nvPr/>
-        </p:nvGrpSpPr>
-        <p:grpSpPr>
-          <a:xfrm>
-            <a:off x="16648765" y="8740635"/>
-            <a:ext cx="1289957" cy="1503995"/>
-            <a:chOff x="0" y="0"/>
-            <a:chExt cx="1719943" cy="2005327"/>
-          </a:xfrm>
-        </p:grpSpPr>
-        <p:grpSp>
-          <p:nvGrpSpPr>
-            <p:cNvPr id="5" name="Group 5"/>
-            <p:cNvGrpSpPr/>
-            <p:nvPr/>
-          </p:nvGrpSpPr>
-          <p:grpSpPr>
-            <a:xfrm>
-              <a:off x="0" y="0"/>
-              <a:ext cx="1719943" cy="1719943"/>
-              <a:chOff x="0" y="0"/>
-              <a:chExt cx="6350000" cy="6350000"/>
-            </a:xfrm>
-          </p:grpSpPr>
-          <p:sp>
-            <p:nvSpPr>
-              <p:cNvPr id="6" name="Freeform 6"/>
-              <p:cNvSpPr/>
-              <p:nvPr/>
-            </p:nvSpPr>
-            <p:spPr>
-              <a:xfrm>
-                <a:off x="14167" y="0"/>
-                <a:ext cx="6321665" cy="6350000"/>
-              </a:xfrm>
-              <a:custGeom>
-                <a:avLst/>
-                <a:gdLst/>
-                <a:ahLst/>
-                <a:cxnLst/>
-                <a:rect l="l" t="t" r="r" b="b"/>
-                <a:pathLst>
-                  <a:path w="6321665" h="6350000">
-                    <a:moveTo>
-                      <a:pt x="3160833" y="0"/>
-                    </a:moveTo>
-                    <a:lnTo>
-                      <a:pt x="3160833" y="0"/>
-                    </a:lnTo>
-                    <a:cubicBezTo>
-                      <a:pt x="4908795" y="7817"/>
-                      <a:pt x="6321666" y="1427021"/>
-                      <a:pt x="6321666" y="3175000"/>
-                    </a:cubicBezTo>
-                    <a:cubicBezTo>
-                      <a:pt x="6321666" y="4922979"/>
-                      <a:pt x="4908795" y="6342183"/>
-                      <a:pt x="3160833" y="6350000"/>
-                    </a:cubicBezTo>
-                    <a:cubicBezTo>
-                      <a:pt x="1412871" y="6342183"/>
-                      <a:pt x="0" y="4922979"/>
-                      <a:pt x="0" y="3175000"/>
-                    </a:cubicBezTo>
-                    <a:cubicBezTo>
-                      <a:pt x="0" y="1427021"/>
-                      <a:pt x="1412871" y="7817"/>
-                      <a:pt x="3160833" y="0"/>
-                    </a:cubicBezTo>
-                    <a:close/>
-                  </a:path>
-                </a:pathLst>
-              </a:custGeom>
-              <a:solidFill>
-                <a:srgbClr val="FF914D"/>
-              </a:solidFill>
-            </p:spPr>
-          </p:sp>
-        </p:grpSp>
-        <p:sp>
-          <p:nvSpPr>
-            <p:cNvPr id="7" name="TextBox 7"/>
-            <p:cNvSpPr txBox="1"/>
-            <p:nvPr/>
-          </p:nvSpPr>
-          <p:spPr>
-            <a:xfrm>
-              <a:off x="350345" y="421132"/>
-              <a:ext cx="1019250" cy="1584195"/>
-            </a:xfrm>
-            <a:prstGeom prst="rect">
-              <a:avLst/>
-            </a:prstGeom>
-          </p:spPr>
-          <p:txBody>
-            <a:bodyPr wrap="square" lIns="0" tIns="0" rIns="0" bIns="0" rtlCol="0" anchor="t">
-              <a:spAutoFit/>
-            </a:bodyPr>
-            <a:lstStyle/>
-            <a:p>
-              <a:pPr algn="ctr">
-                <a:lnSpc>
-                  <a:spcPts val="4759"/>
-                </a:lnSpc>
-              </a:pPr>
-              <a:r>
-                <a:rPr lang="en-US" sz="3350" dirty="0">
-                  <a:solidFill>
-                    <a:srgbClr val="FFFFFF"/>
-                  </a:solidFill>
-                  <a:latin typeface="Open Sans Light Bold"/>
-                  <a:ea typeface="Open Sans Light Bold"/>
-                  <a:cs typeface="Open Sans Light Bold"/>
-                </a:rPr>
-                <a:t>10</a:t>
-              </a:r>
-            </a:p>
-            <a:p>
-              <a:pPr algn="ctr">
-                <a:lnSpc>
-                  <a:spcPts val="4759"/>
-                </a:lnSpc>
-              </a:pPr>
-              <a:endParaRPr lang="en-US" sz="3350" dirty="0">
-                <a:solidFill>
-                  <a:srgbClr val="FFFFFF"/>
-                </a:solidFill>
-                <a:latin typeface="Open Sans Light Bold"/>
-                <a:ea typeface="Open Sans Light Bold"/>
-                <a:cs typeface="Open Sans Light Bold"/>
-              </a:endParaRPr>
-            </a:p>
-          </p:txBody>
-        </p:sp>
-      </p:grpSp>
-      <p:pic>
-        <p:nvPicPr>
-          <p:cNvPr id="8" name="Picture 8"/>
-          <p:cNvPicPr>
-            <a:picLocks noChangeAspect="1"/>
-          </p:cNvPicPr>
-          <p:nvPr/>
-        </p:nvPicPr>
-        <p:blipFill>
-          <a:blip r:embed="rId2"/>
-          <a:srcRect/>
-          <a:stretch>
-            <a:fillRect/>
-          </a:stretch>
-        </p:blipFill>
-        <p:spPr>
-          <a:xfrm>
-            <a:off x="533932" y="3615601"/>
-            <a:ext cx="2595069" cy="2595069"/>
-          </a:xfrm>
-          <a:prstGeom prst="rect">
-            <a:avLst/>
-          </a:prstGeom>
-        </p:spPr>
-      </p:pic>
-      <p:pic>
-        <p:nvPicPr>
-          <p:cNvPr id="9" name="Picture 9"/>
-          <p:cNvPicPr>
-            <a:picLocks noChangeAspect="1"/>
-          </p:cNvPicPr>
-          <p:nvPr/>
-        </p:nvPicPr>
-        <p:blipFill>
-          <a:blip r:embed="rId3"/>
-          <a:srcRect/>
-          <a:stretch>
-            <a:fillRect/>
-          </a:stretch>
-        </p:blipFill>
-        <p:spPr>
-          <a:xfrm>
-            <a:off x="4326657" y="6603394"/>
-            <a:ext cx="2782219" cy="2782219"/>
-          </a:xfrm>
-          <a:prstGeom prst="rect">
-            <a:avLst/>
-          </a:prstGeom>
-        </p:spPr>
-      </p:pic>
-      <p:pic>
-        <p:nvPicPr>
-          <p:cNvPr id="11" name="Picture 11"/>
-          <p:cNvPicPr>
-            <a:picLocks noChangeAspect="1"/>
-          </p:cNvPicPr>
-          <p:nvPr/>
-        </p:nvPicPr>
-        <p:blipFill>
-          <a:blip r:embed="rId4"/>
-          <a:srcRect/>
-          <a:stretch>
-            <a:fillRect/>
-          </a:stretch>
-        </p:blipFill>
-        <p:spPr>
-          <a:xfrm>
-            <a:off x="9714198" y="6474224"/>
-            <a:ext cx="2911389" cy="2911389"/>
-          </a:xfrm>
-          <a:prstGeom prst="rect">
-            <a:avLst/>
-          </a:prstGeom>
-        </p:spPr>
-      </p:pic>
-      <p:pic>
-        <p:nvPicPr>
-          <p:cNvPr id="12" name="Picture 12"/>
-          <p:cNvPicPr>
-            <a:picLocks noChangeAspect="1"/>
-          </p:cNvPicPr>
-          <p:nvPr/>
-        </p:nvPicPr>
-        <p:blipFill>
-          <a:blip r:embed="rId5"/>
-          <a:srcRect/>
-          <a:stretch>
-            <a:fillRect/>
-          </a:stretch>
-        </p:blipFill>
-        <p:spPr>
-          <a:xfrm>
-            <a:off x="9286875" y="3696169"/>
-            <a:ext cx="3766035" cy="2118394"/>
-          </a:xfrm>
-          <a:prstGeom prst="rect">
-            <a:avLst/>
-          </a:prstGeom>
-        </p:spPr>
-      </p:pic>
-      <p:pic>
-        <p:nvPicPr>
-          <p:cNvPr id="13" name="Picture 13"/>
-          <p:cNvPicPr>
-            <a:picLocks noChangeAspect="1"/>
-          </p:cNvPicPr>
-          <p:nvPr/>
-        </p:nvPicPr>
-        <p:blipFill>
-          <a:blip r:embed="rId6"/>
-          <a:srcRect/>
-          <a:stretch>
-            <a:fillRect/>
-          </a:stretch>
-        </p:blipFill>
-        <p:spPr>
-          <a:xfrm>
-            <a:off x="3516782" y="4156881"/>
-            <a:ext cx="4401968" cy="1839885"/>
-          </a:xfrm>
-          <a:prstGeom prst="rect">
-            <a:avLst/>
-          </a:prstGeom>
-        </p:spPr>
-      </p:pic>
-      <p:sp>
-        <p:nvSpPr>
-          <p:cNvPr id="14" name="TextBox 14"/>
-          <p:cNvSpPr txBox="1"/>
-          <p:nvPr/>
-        </p:nvSpPr>
-        <p:spPr>
-          <a:xfrm>
-            <a:off x="1105942" y="528866"/>
-            <a:ext cx="6441430" cy="920115"/>
-          </a:xfrm>
-          <a:prstGeom prst="rect">
-            <a:avLst/>
-          </a:prstGeom>
-        </p:spPr>
-        <p:txBody>
-          <a:bodyPr lIns="0" tIns="0" rIns="0" bIns="0" rtlCol="0" anchor="t">
-            <a:spAutoFit/>
-          </a:bodyPr>
-          <a:lstStyle/>
-          <a:p>
-            <a:pPr algn="ctr">
-              <a:lnSpc>
-                <a:spcPts val="7559"/>
-              </a:lnSpc>
-            </a:pPr>
-            <a:r>
-              <a:rPr lang="en-US" sz="5400" dirty="0">
-                <a:solidFill>
-                  <a:srgbClr val="000000"/>
-                </a:solidFill>
-                <a:latin typeface="Open Sans Extra Bold"/>
-              </a:rPr>
-              <a:t>Gestione progetto</a:t>
-            </a:r>
-          </a:p>
-        </p:txBody>
-      </p:sp>
-      <p:sp>
-        <p:nvSpPr>
-          <p:cNvPr id="15" name="TextBox 15"/>
-          <p:cNvSpPr txBox="1"/>
-          <p:nvPr/>
-        </p:nvSpPr>
-        <p:spPr>
-          <a:xfrm>
-            <a:off x="533932" y="1884589"/>
-            <a:ext cx="2272204" cy="877570"/>
-          </a:xfrm>
-          <a:prstGeom prst="rect">
-            <a:avLst/>
-          </a:prstGeom>
-        </p:spPr>
-        <p:txBody>
-          <a:bodyPr wrap="square" lIns="0" tIns="0" rIns="0" bIns="0" rtlCol="0" anchor="t">
-            <a:spAutoFit/>
-          </a:bodyPr>
-          <a:lstStyle/>
-          <a:p>
-            <a:pPr algn="ctr">
-              <a:lnSpc>
-                <a:spcPts val="7279"/>
-              </a:lnSpc>
-            </a:pPr>
-            <a:r>
-              <a:rPr lang="en-US" sz="5199" dirty="0">
-                <a:solidFill>
-                  <a:srgbClr val="000000"/>
-                </a:solidFill>
-                <a:latin typeface="Open Sans"/>
-              </a:rPr>
-              <a:t>Coding</a:t>
-            </a:r>
-          </a:p>
-        </p:txBody>
-      </p:sp>
-      <p:sp>
-        <p:nvSpPr>
-          <p:cNvPr id="16" name="TextBox 16"/>
-          <p:cNvSpPr txBox="1"/>
-          <p:nvPr/>
-        </p:nvSpPr>
-        <p:spPr>
-          <a:xfrm>
-            <a:off x="9286875" y="1884589"/>
-            <a:ext cx="1709291" cy="877570"/>
-          </a:xfrm>
-          <a:prstGeom prst="rect">
-            <a:avLst/>
-          </a:prstGeom>
-        </p:spPr>
-        <p:txBody>
-          <a:bodyPr lIns="0" tIns="0" rIns="0" bIns="0" rtlCol="0" anchor="t">
-            <a:spAutoFit/>
-          </a:bodyPr>
-          <a:lstStyle/>
-          <a:p>
-            <a:pPr algn="ctr">
-              <a:lnSpc>
-                <a:spcPts val="7279"/>
-              </a:lnSpc>
-            </a:pPr>
-            <a:r>
-              <a:rPr lang="en-US" sz="5199" dirty="0">
-                <a:solidFill>
-                  <a:srgbClr val="FFFFFF"/>
-                </a:solidFill>
-                <a:latin typeface="Open Sans"/>
-              </a:rPr>
-              <a:t>Team</a:t>
-            </a:r>
-          </a:p>
-        </p:txBody>
-      </p:sp>
-      <p:pic>
-        <p:nvPicPr>
-          <p:cNvPr id="17" name="Graphic 17">
-            <a:extLst>
-              <a:ext uri="{FF2B5EF4-FFF2-40B4-BE49-F238E27FC236}">
-                <a16:creationId xmlns:a16="http://schemas.microsoft.com/office/drawing/2014/main" id="{CBB7FA5D-E4D2-4DFD-A081-3759BA16E402}"/>
-              </a:ext>
-            </a:extLst>
-          </p:cNvPr>
-          <p:cNvPicPr>
-            <a:picLocks noChangeAspect="1"/>
-          </p:cNvPicPr>
-          <p:nvPr/>
-        </p:nvPicPr>
-        <p:blipFill>
-          <a:blip r:embed="rId7">
-            <a:extLst>
-              <a:ext uri="{96DAC541-7B7A-43D3-8B79-37D633B846F1}">
-                <asvg:svgBlip xmlns:asvg="http://schemas.microsoft.com/office/drawing/2016/SVG/main" r:embed="rId8"/>
-              </a:ext>
-            </a:extLst>
-          </a:blip>
-          <a:stretch>
-            <a:fillRect/>
-          </a:stretch>
-        </p:blipFill>
-        <p:spPr>
-          <a:xfrm>
-            <a:off x="13741058" y="3610377"/>
-            <a:ext cx="3133188" cy="2382583"/>
-          </a:xfrm>
-          <a:prstGeom prst="rect">
-            <a:avLst/>
-          </a:prstGeom>
-        </p:spPr>
-      </p:pic>
     </p:spTree>
   </p:cSld>
   <p:clrMapOvr>
@@ -6118,7 +5618,7 @@
         </p:nvSpPr>
         <p:spPr>
           <a:xfrm>
-            <a:off x="1915132" y="5729839"/>
+            <a:off x="1915132" y="5739364"/>
             <a:ext cx="3948559" cy="966290"/>
           </a:xfrm>
           <a:prstGeom prst="rect">
@@ -6316,7 +5816,7 @@
         </p:nvSpPr>
         <p:spPr>
           <a:xfrm>
-            <a:off x="1915132" y="7834598"/>
+            <a:off x="1915132" y="7691723"/>
             <a:ext cx="5189366" cy="1466427"/>
           </a:xfrm>
           <a:prstGeom prst="rect">
@@ -6885,8 +6385,8 @@
         </p:nvSpPr>
         <p:spPr>
           <a:xfrm>
-            <a:off x="10715867" y="5424390"/>
-            <a:ext cx="5407997" cy="1466427"/>
+            <a:off x="10887317" y="5443440"/>
+            <a:ext cx="5636597" cy="966290"/>
           </a:xfrm>
           <a:prstGeom prst="rect">
             <a:avLst/>
@@ -7242,7 +6742,7 @@
         </p:nvSpPr>
         <p:spPr>
           <a:xfrm>
-            <a:off x="10723245" y="7292878"/>
+            <a:off x="10608945" y="7150003"/>
             <a:ext cx="5407997" cy="1466427"/>
           </a:xfrm>
           <a:prstGeom prst="rect">
@@ -7390,7 +6890,28 @@
                 <a:ea typeface="Open Sans Light"/>
                 <a:cs typeface="Open Sans Light"/>
               </a:rPr>
-              <a:t> (-1 se il file non </a:t>
+              <a:t> </a:t>
+            </a:r>
+            <a:br>
+              <a:rPr lang="en-US" sz="2750" dirty="0">
+                <a:solidFill>
+                  <a:srgbClr val="FFFFFF"/>
+                </a:solidFill>
+                <a:latin typeface="Open Sans Light"/>
+                <a:ea typeface="Open Sans Light"/>
+                <a:cs typeface="Open Sans Light"/>
+              </a:rPr>
+            </a:br>
+            <a:r>
+              <a:rPr lang="en-US" sz="2750" dirty="0">
+                <a:solidFill>
+                  <a:srgbClr val="FFFFFF"/>
+                </a:solidFill>
+                <a:latin typeface="Open Sans Light"/>
+                <a:ea typeface="Open Sans Light"/>
+                <a:cs typeface="Open Sans Light"/>
+              </a:rPr>
+              <a:t>(-1 se il file non </a:t>
             </a:r>
             <a:r>
               <a:rPr lang="en-US" sz="2750" dirty="0" err="1">
@@ -9485,6 +9006,36 @@
           </a:p>
         </p:txBody>
       </p:sp>
+      <p:pic>
+        <p:nvPicPr>
+          <p:cNvPr id="2" name="Picture 2" descr="Text&#10;&#10;Description automatically generated">
+            <a:extLst>
+              <a:ext uri="{FF2B5EF4-FFF2-40B4-BE49-F238E27FC236}">
+                <a16:creationId xmlns:a16="http://schemas.microsoft.com/office/drawing/2014/main" id="{DC5FC02D-83F6-4E61-A5D5-A4C070E6D068}"/>
+              </a:ext>
+            </a:extLst>
+          </p:cNvPr>
+          <p:cNvPicPr>
+            <a:picLocks noChangeAspect="1"/>
+          </p:cNvPicPr>
+          <p:nvPr/>
+        </p:nvPicPr>
+        <p:blipFill>
+          <a:blip r:embed="rId2"/>
+          <a:stretch>
+            <a:fillRect/>
+          </a:stretch>
+        </p:blipFill>
+        <p:spPr>
+          <a:xfrm>
+            <a:off x="352425" y="1531233"/>
+            <a:ext cx="14001750" cy="8500883"/>
+          </a:xfrm>
+          <a:prstGeom prst="rect">
+            <a:avLst/>
+          </a:prstGeom>
+        </p:spPr>
+      </p:pic>
     </p:spTree>
   </p:cSld>
   <p:clrMapOvr>
@@ -9905,6 +9456,36 @@
           </a:p>
         </p:txBody>
       </p:sp>
+      <p:pic>
+        <p:nvPicPr>
+          <p:cNvPr id="9" name="Picture 10" descr="Text&#10;&#10;Description automatically generated">
+            <a:extLst>
+              <a:ext uri="{FF2B5EF4-FFF2-40B4-BE49-F238E27FC236}">
+                <a16:creationId xmlns:a16="http://schemas.microsoft.com/office/drawing/2014/main" id="{3BBA794C-E776-4664-93CB-7D026C9BD284}"/>
+              </a:ext>
+            </a:extLst>
+          </p:cNvPr>
+          <p:cNvPicPr>
+            <a:picLocks noChangeAspect="1"/>
+          </p:cNvPicPr>
+          <p:nvPr/>
+        </p:nvPicPr>
+        <p:blipFill>
+          <a:blip r:embed="rId2"/>
+          <a:stretch>
+            <a:fillRect/>
+          </a:stretch>
+        </p:blipFill>
+        <p:spPr>
+          <a:xfrm>
+            <a:off x="352425" y="1578556"/>
+            <a:ext cx="10267950" cy="8139538"/>
+          </a:xfrm>
+          <a:prstGeom prst="rect">
+            <a:avLst/>
+          </a:prstGeom>
+        </p:spPr>
+      </p:pic>
     </p:spTree>
   </p:cSld>
   <p:clrMapOvr>
@@ -10188,6 +9769,36 @@
           </a:p>
         </p:txBody>
       </p:sp>
+      <p:pic>
+        <p:nvPicPr>
+          <p:cNvPr id="2" name="Picture 2" descr="Text&#10;&#10;Description automatically generated">
+            <a:extLst>
+              <a:ext uri="{FF2B5EF4-FFF2-40B4-BE49-F238E27FC236}">
+                <a16:creationId xmlns:a16="http://schemas.microsoft.com/office/drawing/2014/main" id="{2E477557-BB05-4E17-8263-8C12C4F90BDC}"/>
+              </a:ext>
+            </a:extLst>
+          </p:cNvPr>
+          <p:cNvPicPr>
+            <a:picLocks noChangeAspect="1"/>
+          </p:cNvPicPr>
+          <p:nvPr/>
+        </p:nvPicPr>
+        <p:blipFill>
+          <a:blip r:embed="rId2"/>
+          <a:stretch>
+            <a:fillRect/>
+          </a:stretch>
+        </p:blipFill>
+        <p:spPr>
+          <a:xfrm>
+            <a:off x="352425" y="1640251"/>
+            <a:ext cx="9705975" cy="8159023"/>
+          </a:xfrm>
+          <a:prstGeom prst="rect">
+            <a:avLst/>
+          </a:prstGeom>
+        </p:spPr>
+      </p:pic>
     </p:spTree>
     <p:extLst>
       <p:ext uri="{BB962C8B-B14F-4D97-AF65-F5344CB8AC3E}">
@@ -10615,6 +10226,36 @@
           </a:p>
         </p:txBody>
       </p:sp>
+      <p:pic>
+        <p:nvPicPr>
+          <p:cNvPr id="9" name="Picture 10" descr="Text&#10;&#10;Description automatically generated">
+            <a:extLst>
+              <a:ext uri="{FF2B5EF4-FFF2-40B4-BE49-F238E27FC236}">
+                <a16:creationId xmlns:a16="http://schemas.microsoft.com/office/drawing/2014/main" id="{6A078FFC-07F5-4476-98ED-F32CC4B34DD7}"/>
+              </a:ext>
+            </a:extLst>
+          </p:cNvPr>
+          <p:cNvPicPr>
+            <a:picLocks noChangeAspect="1"/>
+          </p:cNvPicPr>
+          <p:nvPr/>
+        </p:nvPicPr>
+        <p:blipFill>
+          <a:blip r:embed="rId2"/>
+          <a:stretch>
+            <a:fillRect/>
+          </a:stretch>
+        </p:blipFill>
+        <p:spPr>
+          <a:xfrm>
+            <a:off x="352425" y="2147700"/>
+            <a:ext cx="9372600" cy="7506075"/>
+          </a:xfrm>
+          <a:prstGeom prst="rect">
+            <a:avLst/>
+          </a:prstGeom>
+        </p:spPr>
+      </p:pic>
     </p:spTree>
     <p:extLst>
       <p:ext uri="{BB962C8B-B14F-4D97-AF65-F5344CB8AC3E}">
@@ -10661,8 +10302,8 @@
         </p:nvGrpSpPr>
         <p:grpSpPr>
           <a:xfrm>
-            <a:off x="-12284" y="0"/>
-            <a:ext cx="18300284" cy="10287000"/>
+            <a:off x="8629650" y="0"/>
+            <a:ext cx="9658350" cy="10287000"/>
             <a:chOff x="0" y="0"/>
             <a:chExt cx="3267146" cy="3479800"/>
           </a:xfrm>
@@ -10717,9 +10358,9 @@
         <p:grpSpPr>
           <a:xfrm>
             <a:off x="16648765" y="8740635"/>
-            <a:ext cx="1289957" cy="1289957"/>
+            <a:ext cx="1289957" cy="2119548"/>
             <a:chOff x="0" y="0"/>
-            <a:chExt cx="1719943" cy="1719943"/>
+            <a:chExt cx="1719943" cy="2826064"/>
           </a:xfrm>
         </p:grpSpPr>
         <p:grpSp>
@@ -10799,15 +10440,15 @@
           </p:nvSpPr>
           <p:spPr>
             <a:xfrm>
-              <a:off x="696856" y="450820"/>
-              <a:ext cx="326231" cy="763457"/>
+              <a:off x="350345" y="421132"/>
+              <a:ext cx="1019250" cy="2404932"/>
             </a:xfrm>
             <a:prstGeom prst="rect">
               <a:avLst/>
             </a:prstGeom>
           </p:spPr>
           <p:txBody>
-            <a:bodyPr lIns="0" tIns="0" rIns="0" bIns="0" rtlCol="0" anchor="t">
+            <a:bodyPr wrap="square" lIns="0" tIns="0" rIns="0" bIns="0" rtlCol="0" anchor="t">
               <a:spAutoFit/>
             </a:bodyPr>
             <a:lstStyle/>
@@ -10829,31 +10470,186 @@
                 <a:t>9</a:t>
               </a:r>
             </a:p>
+            <a:p>
+              <a:pPr algn="ctr">
+                <a:lnSpc>
+                  <a:spcPts val="4759"/>
+                </a:lnSpc>
+              </a:pPr>
+              <a:endParaRPr lang="en-US" sz="3350" dirty="0">
+                <a:solidFill>
+                  <a:srgbClr val="FFFFFF"/>
+                </a:solidFill>
+                <a:latin typeface="Open Sans Light Bold"/>
+                <a:ea typeface="Open Sans Light Bold"/>
+                <a:cs typeface="Open Sans Light Bold"/>
+              </a:endParaRPr>
+            </a:p>
+            <a:p>
+              <a:pPr algn="ctr">
+                <a:lnSpc>
+                  <a:spcPts val="4759"/>
+                </a:lnSpc>
+              </a:pPr>
+              <a:endParaRPr lang="en-US" sz="3350" dirty="0">
+                <a:solidFill>
+                  <a:srgbClr val="FFFFFF"/>
+                </a:solidFill>
+                <a:latin typeface="Open Sans Light Bold"/>
+                <a:ea typeface="Open Sans Light Bold"/>
+                <a:cs typeface="Open Sans Light Bold"/>
+              </a:endParaRPr>
+            </a:p>
           </p:txBody>
         </p:sp>
       </p:grpSp>
-      <p:sp>
-        <p:nvSpPr>
-          <p:cNvPr id="8" name="TextBox 8"/>
-          <p:cNvSpPr txBox="1"/>
+      <p:pic>
+        <p:nvPicPr>
+          <p:cNvPr id="8" name="Picture 8"/>
+          <p:cNvPicPr>
+            <a:picLocks noChangeAspect="1"/>
+          </p:cNvPicPr>
           <p:nvPr/>
-        </p:nvSpPr>
+        </p:nvPicPr>
+        <p:blipFill>
+          <a:blip r:embed="rId2"/>
+          <a:srcRect/>
+          <a:stretch>
+            <a:fillRect/>
+          </a:stretch>
+        </p:blipFill>
         <p:spPr>
           <a:xfrm>
-            <a:off x="350490" y="569687"/>
-            <a:ext cx="6214170" cy="909736"/>
+            <a:off x="533932" y="3615601"/>
+            <a:ext cx="2595069" cy="2595069"/>
           </a:xfrm>
           <a:prstGeom prst="rect">
             <a:avLst/>
           </a:prstGeom>
         </p:spPr>
+      </p:pic>
+      <p:pic>
+        <p:nvPicPr>
+          <p:cNvPr id="9" name="Picture 9"/>
+          <p:cNvPicPr>
+            <a:picLocks noChangeAspect="1"/>
+          </p:cNvPicPr>
+          <p:nvPr/>
+        </p:nvPicPr>
+        <p:blipFill>
+          <a:blip r:embed="rId3"/>
+          <a:srcRect/>
+          <a:stretch>
+            <a:fillRect/>
+          </a:stretch>
+        </p:blipFill>
+        <p:spPr>
+          <a:xfrm>
+            <a:off x="4326657" y="6603394"/>
+            <a:ext cx="2782219" cy="2782219"/>
+          </a:xfrm>
+          <a:prstGeom prst="rect">
+            <a:avLst/>
+          </a:prstGeom>
+        </p:spPr>
+      </p:pic>
+      <p:pic>
+        <p:nvPicPr>
+          <p:cNvPr id="11" name="Picture 11"/>
+          <p:cNvPicPr>
+            <a:picLocks noChangeAspect="1"/>
+          </p:cNvPicPr>
+          <p:nvPr/>
+        </p:nvPicPr>
+        <p:blipFill>
+          <a:blip r:embed="rId4"/>
+          <a:srcRect/>
+          <a:stretch>
+            <a:fillRect/>
+          </a:stretch>
+        </p:blipFill>
+        <p:spPr>
+          <a:xfrm>
+            <a:off x="9714198" y="6474224"/>
+            <a:ext cx="2911389" cy="2911389"/>
+          </a:xfrm>
+          <a:prstGeom prst="rect">
+            <a:avLst/>
+          </a:prstGeom>
+        </p:spPr>
+      </p:pic>
+      <p:pic>
+        <p:nvPicPr>
+          <p:cNvPr id="12" name="Picture 12"/>
+          <p:cNvPicPr>
+            <a:picLocks noChangeAspect="1"/>
+          </p:cNvPicPr>
+          <p:nvPr/>
+        </p:nvPicPr>
+        <p:blipFill>
+          <a:blip r:embed="rId5"/>
+          <a:srcRect/>
+          <a:stretch>
+            <a:fillRect/>
+          </a:stretch>
+        </p:blipFill>
+        <p:spPr>
+          <a:xfrm>
+            <a:off x="9286875" y="3696169"/>
+            <a:ext cx="3766035" cy="2118394"/>
+          </a:xfrm>
+          <a:prstGeom prst="rect">
+            <a:avLst/>
+          </a:prstGeom>
+        </p:spPr>
+      </p:pic>
+      <p:pic>
+        <p:nvPicPr>
+          <p:cNvPr id="13" name="Picture 13"/>
+          <p:cNvPicPr>
+            <a:picLocks noChangeAspect="1"/>
+          </p:cNvPicPr>
+          <p:nvPr/>
+        </p:nvPicPr>
+        <p:blipFill>
+          <a:blip r:embed="rId6"/>
+          <a:srcRect/>
+          <a:stretch>
+            <a:fillRect/>
+          </a:stretch>
+        </p:blipFill>
+        <p:spPr>
+          <a:xfrm>
+            <a:off x="3516782" y="4156881"/>
+            <a:ext cx="4401968" cy="1839885"/>
+          </a:xfrm>
+          <a:prstGeom prst="rect">
+            <a:avLst/>
+          </a:prstGeom>
+        </p:spPr>
+      </p:pic>
+      <p:sp>
+        <p:nvSpPr>
+          <p:cNvPr id="14" name="TextBox 14"/>
+          <p:cNvSpPr txBox="1"/>
+          <p:nvPr/>
+        </p:nvSpPr>
+        <p:spPr>
+          <a:xfrm>
+            <a:off x="1105942" y="528866"/>
+            <a:ext cx="6441430" cy="920115"/>
+          </a:xfrm>
+          <a:prstGeom prst="rect">
+            <a:avLst/>
+          </a:prstGeom>
+        </p:spPr>
         <p:txBody>
           <a:bodyPr lIns="0" tIns="0" rIns="0" bIns="0" rtlCol="0" anchor="t">
             <a:spAutoFit/>
           </a:bodyPr>
           <a:lstStyle/>
           <a:p>
-            <a:pPr algn="just">
+            <a:pPr algn="ctr">
               <a:lnSpc>
                 <a:spcPts val="7559"/>
               </a:lnSpc>
@@ -10861,39 +10657,25 @@
             <a:r>
               <a:rPr lang="en-US" sz="5400" dirty="0">
                 <a:solidFill>
-                  <a:schemeClr val="bg1"/>
+                  <a:srgbClr val="000000"/>
                 </a:solidFill>
                 <a:latin typeface="Open Sans Extra Bold"/>
               </a:rPr>
-              <a:t>Benchmarks</a:t>
-            </a:r>
-            <a:endParaRPr lang="en-US" sz="5400" dirty="0">
-              <a:solidFill>
-                <a:schemeClr val="bg1"/>
-              </a:solidFill>
-              <a:latin typeface="Open Sans Extra Bold"/>
-              <a:ea typeface="Open Sans Extra Bold"/>
-              <a:cs typeface="Open Sans Extra Bold"/>
-            </a:endParaRPr>
-          </a:p>
-        </p:txBody>
-      </p:sp>
-      <p:sp>
-        <p:nvSpPr>
-          <p:cNvPr id="9" name="TextBox 30">
-            <a:extLst>
-              <a:ext uri="{FF2B5EF4-FFF2-40B4-BE49-F238E27FC236}">
-                <a16:creationId xmlns:a16="http://schemas.microsoft.com/office/drawing/2014/main" id="{A8D948AD-B12E-4B99-9E8F-0F4121024E9D}"/>
-              </a:ext>
-            </a:extLst>
-          </p:cNvPr>
+              <a:t>Gestione progetto</a:t>
+            </a:r>
+          </a:p>
+        </p:txBody>
+      </p:sp>
+      <p:sp>
+        <p:nvSpPr>
+          <p:cNvPr id="15" name="TextBox 15"/>
           <p:cNvSpPr txBox="1"/>
           <p:nvPr/>
         </p:nvSpPr>
         <p:spPr>
           <a:xfrm>
-            <a:off x="355797" y="1850230"/>
-            <a:ext cx="7509570" cy="468205"/>
+            <a:off x="533932" y="1884589"/>
+            <a:ext cx="2272204" cy="877570"/>
           </a:xfrm>
           <a:prstGeom prst="rect">
             <a:avLst/>
@@ -10905,42 +10687,98 @@
           </a:bodyPr>
           <a:lstStyle/>
           <a:p>
-            <a:pPr>
+            <a:pPr algn="ctr">
               <a:lnSpc>
-                <a:spcPts val="3863"/>
+                <a:spcPts val="7279"/>
               </a:lnSpc>
-              <a:spcBef>
-                <a:spcPct val="0"/>
-              </a:spcBef>
             </a:pPr>
             <a:r>
-              <a:rPr lang="en-US" sz="2750" dirty="0">
-                <a:solidFill>
-                  <a:schemeClr val="bg1"/>
-                </a:solidFill>
-                <a:latin typeface="&amp;quot;Open Sans Light_MSFontSer"/>
-                <a:ea typeface="+mn-lt"/>
-                <a:cs typeface="+mn-lt"/>
-              </a:rPr>
-              <a:t>Riferimenti benchmark:</a:t>
-            </a:r>
-            <a:endParaRPr lang="en-US" dirty="0">
-              <a:solidFill>
-                <a:schemeClr val="bg1"/>
-              </a:solidFill>
-              <a:latin typeface="&amp;quot;Open Sans Light_MSFontSer"/>
-              <a:ea typeface="+mn-lt"/>
-              <a:cs typeface="+mn-lt"/>
-            </a:endParaRPr>
-          </a:p>
-        </p:txBody>
-      </p:sp>
+              <a:rPr lang="en-US" sz="5199" dirty="0">
+                <a:solidFill>
+                  <a:srgbClr val="000000"/>
+                </a:solidFill>
+                <a:latin typeface="Open Sans"/>
+              </a:rPr>
+              <a:t>Coding</a:t>
+            </a:r>
+          </a:p>
+        </p:txBody>
+      </p:sp>
+      <p:sp>
+        <p:nvSpPr>
+          <p:cNvPr id="16" name="TextBox 16"/>
+          <p:cNvSpPr txBox="1"/>
+          <p:nvPr/>
+        </p:nvSpPr>
+        <p:spPr>
+          <a:xfrm>
+            <a:off x="9286875" y="1884589"/>
+            <a:ext cx="1709291" cy="877570"/>
+          </a:xfrm>
+          <a:prstGeom prst="rect">
+            <a:avLst/>
+          </a:prstGeom>
+        </p:spPr>
+        <p:txBody>
+          <a:bodyPr lIns="0" tIns="0" rIns="0" bIns="0" rtlCol="0" anchor="t">
+            <a:spAutoFit/>
+          </a:bodyPr>
+          <a:lstStyle/>
+          <a:p>
+            <a:pPr algn="ctr">
+              <a:lnSpc>
+                <a:spcPts val="7279"/>
+              </a:lnSpc>
+            </a:pPr>
+            <a:r>
+              <a:rPr lang="en-US" sz="5199" dirty="0">
+                <a:solidFill>
+                  <a:srgbClr val="FFFFFF"/>
+                </a:solidFill>
+                <a:latin typeface="Open Sans"/>
+              </a:rPr>
+              <a:t>Team</a:t>
+            </a:r>
+          </a:p>
+        </p:txBody>
+      </p:sp>
+      <p:pic>
+        <p:nvPicPr>
+          <p:cNvPr id="17" name="Graphic 17">
+            <a:extLst>
+              <a:ext uri="{FF2B5EF4-FFF2-40B4-BE49-F238E27FC236}">
+                <a16:creationId xmlns:a16="http://schemas.microsoft.com/office/drawing/2014/main" id="{CBB7FA5D-E4D2-4DFD-A081-3759BA16E402}"/>
+              </a:ext>
+            </a:extLst>
+          </p:cNvPr>
+          <p:cNvPicPr>
+            <a:picLocks noChangeAspect="1"/>
+          </p:cNvPicPr>
+          <p:nvPr/>
+        </p:nvPicPr>
+        <p:blipFill>
+          <a:blip r:embed="rId7">
+            <a:extLst>
+              <a:ext uri="{96DAC541-7B7A-43D3-8B79-37D633B846F1}">
+                <asvg:svgBlip xmlns:asvg="http://schemas.microsoft.com/office/drawing/2016/SVG/main" r:embed="rId8"/>
+              </a:ext>
+            </a:extLst>
+          </a:blip>
+          <a:stretch>
+            <a:fillRect/>
+          </a:stretch>
+        </p:blipFill>
+        <p:spPr>
+          <a:xfrm>
+            <a:off x="13741058" y="3610377"/>
+            <a:ext cx="3133188" cy="2382583"/>
+          </a:xfrm>
+          <a:prstGeom prst="rect">
+            <a:avLst/>
+          </a:prstGeom>
+        </p:spPr>
+      </p:pic>
     </p:spTree>
-    <p:extLst>
-      <p:ext uri="{BB962C8B-B14F-4D97-AF65-F5344CB8AC3E}">
-        <p14:creationId xmlns:p14="http://schemas.microsoft.com/office/powerpoint/2010/main" val="2636156596"/>
-      </p:ext>
-    </p:extLst>
   </p:cSld>
   <p:clrMapOvr>
     <a:masterClrMapping/>

</xml_diff>

<commit_message>
changed: aggiornate le presentazioni
</commit_message>
<xml_diff>
--- a/esercitazione_3/documents/Esercitazione 3.pptx
+++ b/esercitazione_3/documents/Esercitazione 3.pptx
@@ -163,6 +163,7 @@
 <file path=ppt/revisionInfo.xml><?xml version="1.0" encoding="utf-8"?>
 <p1510:revInfo xmlns:a="http://schemas.openxmlformats.org/drawingml/2006/main" xmlns:r="http://schemas.openxmlformats.org/officeDocument/2006/relationships" xmlns:p1510="http://schemas.microsoft.com/office/powerpoint/2015/10/main">
   <p1510:revLst>
+    <p1510:client id="{15BB80DA-39E0-EB22-234F-00C6CDC5EB2E}" v="25" dt="2021-11-02T08:31:21.331"/>
     <p1510:client id="{93E8013D-5D9F-D8D0-3077-AD1DAEF36394}" v="56" dt="2021-11-02T00:15:21.420"/>
   </p1510:revLst>
 </p1510:revInfo>
@@ -348,7 +349,7 @@
             <a:fld id="{1D8BD707-D9CF-40AE-B4C6-C98DA3205C09}" type="datetimeFigureOut">
               <a:rPr lang="en-US" smtClean="0"/>
               <a:pPr/>
-              <a:t>11/1/2021</a:t>
+              <a:t>11/2/2021</a:t>
             </a:fld>
             <a:endParaRPr lang="en-US" dirty="0"/>
           </a:p>
@@ -513,7 +514,7 @@
             <a:fld id="{1D8BD707-D9CF-40AE-B4C6-C98DA3205C09}" type="datetimeFigureOut">
               <a:rPr lang="en-US" smtClean="0"/>
               <a:pPr/>
-              <a:t>11/1/2021</a:t>
+              <a:t>11/2/2021</a:t>
             </a:fld>
             <a:endParaRPr lang="en-US" dirty="0"/>
           </a:p>
@@ -688,7 +689,7 @@
             <a:fld id="{1D8BD707-D9CF-40AE-B4C6-C98DA3205C09}" type="datetimeFigureOut">
               <a:rPr lang="en-US" smtClean="0"/>
               <a:pPr/>
-              <a:t>11/1/2021</a:t>
+              <a:t>11/2/2021</a:t>
             </a:fld>
             <a:endParaRPr lang="en-US" dirty="0"/>
           </a:p>
@@ -853,7 +854,7 @@
             <a:fld id="{1D8BD707-D9CF-40AE-B4C6-C98DA3205C09}" type="datetimeFigureOut">
               <a:rPr lang="en-US" smtClean="0"/>
               <a:pPr/>
-              <a:t>11/1/2021</a:t>
+              <a:t>11/2/2021</a:t>
             </a:fld>
             <a:endParaRPr lang="en-US" dirty="0"/>
           </a:p>
@@ -1095,7 +1096,7 @@
             <a:fld id="{1D8BD707-D9CF-40AE-B4C6-C98DA3205C09}" type="datetimeFigureOut">
               <a:rPr lang="en-US" smtClean="0"/>
               <a:pPr/>
-              <a:t>11/1/2021</a:t>
+              <a:t>11/2/2021</a:t>
             </a:fld>
             <a:endParaRPr lang="en-US" dirty="0"/>
           </a:p>
@@ -1377,7 +1378,7 @@
             <a:fld id="{1D8BD707-D9CF-40AE-B4C6-C98DA3205C09}" type="datetimeFigureOut">
               <a:rPr lang="en-US" smtClean="0"/>
               <a:pPr/>
-              <a:t>11/1/2021</a:t>
+              <a:t>11/2/2021</a:t>
             </a:fld>
             <a:endParaRPr lang="en-US" dirty="0"/>
           </a:p>
@@ -1793,7 +1794,7 @@
             <a:fld id="{1D8BD707-D9CF-40AE-B4C6-C98DA3205C09}" type="datetimeFigureOut">
               <a:rPr lang="en-US" smtClean="0"/>
               <a:pPr/>
-              <a:t>11/1/2021</a:t>
+              <a:t>11/2/2021</a:t>
             </a:fld>
             <a:endParaRPr lang="en-US" dirty="0"/>
           </a:p>
@@ -1907,7 +1908,7 @@
             <a:fld id="{1D8BD707-D9CF-40AE-B4C6-C98DA3205C09}" type="datetimeFigureOut">
               <a:rPr lang="en-US" smtClean="0"/>
               <a:pPr/>
-              <a:t>11/1/2021</a:t>
+              <a:t>11/2/2021</a:t>
             </a:fld>
             <a:endParaRPr lang="en-US" dirty="0"/>
           </a:p>
@@ -1999,7 +2000,7 @@
             <a:fld id="{1D8BD707-D9CF-40AE-B4C6-C98DA3205C09}" type="datetimeFigureOut">
               <a:rPr lang="en-US" smtClean="0"/>
               <a:pPr/>
-              <a:t>11/1/2021</a:t>
+              <a:t>11/2/2021</a:t>
             </a:fld>
             <a:endParaRPr lang="en-US" dirty="0"/>
           </a:p>
@@ -2271,7 +2272,7 @@
             <a:fld id="{1D8BD707-D9CF-40AE-B4C6-C98DA3205C09}" type="datetimeFigureOut">
               <a:rPr lang="en-US" smtClean="0"/>
               <a:pPr/>
-              <a:t>11/1/2021</a:t>
+              <a:t>11/2/2021</a:t>
             </a:fld>
             <a:endParaRPr lang="en-US" dirty="0"/>
           </a:p>
@@ -2520,7 +2521,7 @@
             <a:fld id="{1D8BD707-D9CF-40AE-B4C6-C98DA3205C09}" type="datetimeFigureOut">
               <a:rPr lang="en-US" smtClean="0"/>
               <a:pPr/>
-              <a:t>11/1/2021</a:t>
+              <a:t>11/2/2021</a:t>
             </a:fld>
             <a:endParaRPr lang="en-US" dirty="0"/>
           </a:p>
@@ -2728,7 +2729,7 @@
             <a:fld id="{1D8BD707-D9CF-40AE-B4C6-C98DA3205C09}" type="datetimeFigureOut">
               <a:rPr lang="en-US" smtClean="0"/>
               <a:pPr/>
-              <a:t>11/1/2021</a:t>
+              <a:t>11/2/2021</a:t>
             </a:fld>
             <a:endParaRPr lang="en-US" dirty="0"/>
           </a:p>
@@ -9458,10 +9459,10 @@
       </p:sp>
       <p:pic>
         <p:nvPicPr>
-          <p:cNvPr id="9" name="Picture 10" descr="Text&#10;&#10;Description automatically generated">
+          <p:cNvPr id="11" name="Picture 11" descr="Text&#10;&#10;Description automatically generated">
             <a:extLst>
               <a:ext uri="{FF2B5EF4-FFF2-40B4-BE49-F238E27FC236}">
-                <a16:creationId xmlns:a16="http://schemas.microsoft.com/office/drawing/2014/main" id="{3BBA794C-E776-4664-93CB-7D026C9BD284}"/>
+                <a16:creationId xmlns:a16="http://schemas.microsoft.com/office/drawing/2014/main" id="{4A25DDF1-808D-4BAB-8375-462FC16F38D2}"/>
               </a:ext>
             </a:extLst>
           </p:cNvPr>
@@ -9478,8 +9479,8 @@
         </p:blipFill>
         <p:spPr>
           <a:xfrm>
-            <a:off x="352425" y="1578556"/>
-            <a:ext cx="10267950" cy="8139538"/>
+            <a:off x="352425" y="1659176"/>
+            <a:ext cx="12153900" cy="8149748"/>
           </a:xfrm>
           <a:prstGeom prst="rect">
             <a:avLst/>
@@ -9946,7 +9947,7 @@
         </p:nvSpPr>
         <p:spPr>
           <a:xfrm>
-            <a:off x="1039241" y="1155029"/>
+            <a:off x="5420741" y="669254"/>
             <a:ext cx="6951218" cy="821250"/>
           </a:xfrm>
           <a:prstGeom prst="rect">
@@ -10228,10 +10229,10 @@
       </p:sp>
       <p:pic>
         <p:nvPicPr>
-          <p:cNvPr id="9" name="Picture 10" descr="Text&#10;&#10;Description automatically generated">
+          <p:cNvPr id="12" name="Picture 12" descr="Text&#10;&#10;Description automatically generated">
             <a:extLst>
               <a:ext uri="{FF2B5EF4-FFF2-40B4-BE49-F238E27FC236}">
-                <a16:creationId xmlns:a16="http://schemas.microsoft.com/office/drawing/2014/main" id="{6A078FFC-07F5-4476-98ED-F32CC4B34DD7}"/>
+                <a16:creationId xmlns:a16="http://schemas.microsoft.com/office/drawing/2014/main" id="{6E6C643C-A765-4385-A187-9254F12F2379}"/>
               </a:ext>
             </a:extLst>
           </p:cNvPr>
@@ -10248,8 +10249,8 @@
         </p:blipFill>
         <p:spPr>
           <a:xfrm>
-            <a:off x="352425" y="2147700"/>
-            <a:ext cx="9372600" cy="7506075"/>
+            <a:off x="352425" y="1639149"/>
+            <a:ext cx="14220825" cy="7980252"/>
           </a:xfrm>
           <a:prstGeom prst="rect">
             <a:avLst/>

</xml_diff>